<commit_message>
Fixes for beta test
</commit_message>
<xml_diff>
--- a/app/data/Remaja_template.pptx
+++ b/app/data/Remaja_template.pptx
@@ -258,6 +258,9 @@
   <p:extLst>
     <p:ext uri="{EFAFB233-063F-42B5-8137-9DF3F51BA10A}">
       <p15:sldGuideLst xmlns:p15="http://schemas.microsoft.com/office/powerpoint/2012/main"/>
+    </p:ext>
+    <p:ext uri="{2D200454-40CA-4A62-9FC3-DE9A4176ACB9}">
+      <p15:notesGuideLst xmlns:p15="http://schemas.microsoft.com/office/powerpoint/2012/main"/>
     </p:ext>
   </p:extLst>
 </p:presentation>
@@ -1019,13 +1022,13 @@
   <p:clrMapOvr>
     <a:masterClrMapping/>
   </p:clrMapOvr>
-  <mc:AlternateContent xmlns:mc="http://schemas.openxmlformats.org/markup-compatibility/2006">
-    <mc:Choice xmlns:p14="http://schemas.microsoft.com/office/powerpoint/2010/main" Requires="p14">
+  <mc:AlternateContent xmlns:mc="http://schemas.openxmlformats.org/markup-compatibility/2006" xmlns:p14="http://schemas.microsoft.com/office/powerpoint/2010/main">
+    <mc:Choice Requires="p14">
       <p:transition spd="med" p14:dur="700">
         <p:fade/>
       </p:transition>
     </mc:Choice>
-    <mc:Fallback>
+    <mc:Fallback xmlns="">
       <p:transition spd="med">
         <p:fade/>
       </p:transition>
@@ -1660,13 +1663,13 @@
   <p:clrMapOvr>
     <a:masterClrMapping/>
   </p:clrMapOvr>
-  <mc:AlternateContent xmlns:mc="http://schemas.openxmlformats.org/markup-compatibility/2006">
-    <mc:Choice xmlns:p14="http://schemas.microsoft.com/office/powerpoint/2010/main" Requires="p14">
+  <mc:AlternateContent xmlns:mc="http://schemas.openxmlformats.org/markup-compatibility/2006" xmlns:p14="http://schemas.microsoft.com/office/powerpoint/2010/main">
+    <mc:Choice Requires="p14">
       <p:transition spd="med" p14:dur="700">
         <p:fade/>
       </p:transition>
     </mc:Choice>
-    <mc:Fallback>
+    <mc:Fallback xmlns="">
       <p:transition spd="med">
         <p:fade/>
       </p:transition>
@@ -2169,13 +2172,13 @@
   <p:clrMapOvr>
     <a:masterClrMapping/>
   </p:clrMapOvr>
-  <mc:AlternateContent xmlns:mc="http://schemas.openxmlformats.org/markup-compatibility/2006">
-    <mc:Choice xmlns:p14="http://schemas.microsoft.com/office/powerpoint/2010/main" Requires="p14">
+  <mc:AlternateContent xmlns:mc="http://schemas.openxmlformats.org/markup-compatibility/2006" xmlns:p14="http://schemas.microsoft.com/office/powerpoint/2010/main">
+    <mc:Choice Requires="p14">
       <p:transition spd="med" p14:dur="700">
         <p:fade/>
       </p:transition>
     </mc:Choice>
-    <mc:Fallback>
+    <mc:Fallback xmlns="">
       <p:transition spd="med">
         <p:fade/>
       </p:transition>
@@ -4917,13 +4920,13 @@
   <p:clrMapOvr>
     <a:masterClrMapping/>
   </p:clrMapOvr>
-  <mc:AlternateContent xmlns:mc="http://schemas.openxmlformats.org/markup-compatibility/2006">
-    <mc:Choice xmlns:p14="http://schemas.microsoft.com/office/powerpoint/2010/main" Requires="p14">
+  <mc:AlternateContent xmlns:mc="http://schemas.openxmlformats.org/markup-compatibility/2006" xmlns:p14="http://schemas.microsoft.com/office/powerpoint/2010/main">
+    <mc:Choice Requires="p14">
       <p:transition spd="med" p14:dur="700">
         <p:fade/>
       </p:transition>
     </mc:Choice>
-    <mc:Fallback>
+    <mc:Fallback xmlns="">
       <p:transition spd="med">
         <p:fade/>
       </p:transition>
@@ -5101,13 +5104,13 @@
   <p:clrMapOvr>
     <a:masterClrMapping/>
   </p:clrMapOvr>
-  <mc:AlternateContent xmlns:mc="http://schemas.openxmlformats.org/markup-compatibility/2006">
-    <mc:Choice xmlns:p14="http://schemas.microsoft.com/office/powerpoint/2010/main" Requires="p14">
+  <mc:AlternateContent xmlns:mc="http://schemas.openxmlformats.org/markup-compatibility/2006" xmlns:p14="http://schemas.microsoft.com/office/powerpoint/2010/main">
+    <mc:Choice Requires="p14">
       <p:transition spd="med" p14:dur="700">
         <p:fade/>
       </p:transition>
     </mc:Choice>
-    <mc:Fallback>
+    <mc:Fallback xmlns="">
       <p:transition spd="med">
         <p:fade/>
       </p:transition>
@@ -5285,13 +5288,13 @@
   <p:clrMapOvr>
     <a:masterClrMapping/>
   </p:clrMapOvr>
-  <mc:AlternateContent xmlns:mc="http://schemas.openxmlformats.org/markup-compatibility/2006">
-    <mc:Choice xmlns:p14="http://schemas.microsoft.com/office/powerpoint/2010/main" Requires="p14">
+  <mc:AlternateContent xmlns:mc="http://schemas.openxmlformats.org/markup-compatibility/2006" xmlns:p14="http://schemas.microsoft.com/office/powerpoint/2010/main">
+    <mc:Choice Requires="p14">
       <p:transition spd="med" p14:dur="700">
         <p:fade/>
       </p:transition>
     </mc:Choice>
-    <mc:Fallback>
+    <mc:Fallback xmlns="">
       <p:transition spd="med">
         <p:fade/>
       </p:transition>
@@ -5431,7 +5434,7 @@
         </p:nvSpPr>
         <p:spPr>
           <a:xfrm>
-            <a:off x="647700" y="1790699"/>
+            <a:off x="647700" y="1617979"/>
             <a:ext cx="10985500" cy="3606801"/>
           </a:xfrm>
         </p:spPr>
@@ -5447,13 +5450,8 @@
             <a:pPr lvl="0"/>
             <a:r>
               <a:rPr lang="en-US" dirty="0"/>
-              <a:t>Click to edit Master </a:t>
-            </a:r>
-            <a:r>
-              <a:rPr lang="en-US"/>
-              <a:t>text styles</a:t>
-            </a:r>
-            <a:endParaRPr lang="en-US" dirty="0"/>
+              <a:t>Click to edit Master text styles</a:t>
+            </a:r>
           </a:p>
         </p:txBody>
       </p:sp>
@@ -5513,13 +5511,13 @@
   <p:clrMapOvr>
     <a:masterClrMapping/>
   </p:clrMapOvr>
-  <mc:AlternateContent xmlns:mc="http://schemas.openxmlformats.org/markup-compatibility/2006">
-    <mc:Choice xmlns:p14="http://schemas.microsoft.com/office/powerpoint/2010/main" Requires="p14">
+  <mc:AlternateContent xmlns:mc="http://schemas.openxmlformats.org/markup-compatibility/2006" xmlns:p14="http://schemas.microsoft.com/office/powerpoint/2010/main">
+    <mc:Choice Requires="p14">
       <p:transition p14:dur="250">
         <p:fade/>
       </p:transition>
     </mc:Choice>
-    <mc:Fallback>
+    <mc:Fallback xmlns="">
       <p:transition>
         <p:fade/>
       </p:transition>
@@ -5675,7 +5673,7 @@
         </p:nvSpPr>
         <p:spPr>
           <a:xfrm>
-            <a:off x="647700" y="1790699"/>
+            <a:off x="647700" y="1597659"/>
             <a:ext cx="10985500" cy="3606801"/>
           </a:xfrm>
         </p:spPr>
@@ -5757,13 +5755,13 @@
   <p:clrMapOvr>
     <a:masterClrMapping/>
   </p:clrMapOvr>
-  <mc:AlternateContent xmlns:mc="http://schemas.openxmlformats.org/markup-compatibility/2006">
-    <mc:Choice xmlns:p14="http://schemas.microsoft.com/office/powerpoint/2010/main" Requires="p14">
+  <mc:AlternateContent xmlns:mc="http://schemas.openxmlformats.org/markup-compatibility/2006" xmlns:p14="http://schemas.microsoft.com/office/powerpoint/2010/main">
+    <mc:Choice Requires="p14">
       <p:transition p14:dur="250">
         <p:fade/>
       </p:transition>
     </mc:Choice>
-    <mc:Fallback>
+    <mc:Fallback xmlns="">
       <p:transition>
         <p:fade/>
       </p:transition>
@@ -5919,7 +5917,7 @@
         </p:nvSpPr>
         <p:spPr>
           <a:xfrm>
-            <a:off x="4704522" y="1790699"/>
+            <a:off x="4704522" y="1577339"/>
             <a:ext cx="7138482" cy="3606801"/>
           </a:xfrm>
         </p:spPr>
@@ -5928,20 +5926,15 @@
           <a:lstStyle>
             <a:lvl1pPr marL="50800" indent="0">
               <a:buNone/>
-              <a:defRPr/>
+              <a:defRPr sz="2500"/>
             </a:lvl1pPr>
           </a:lstStyle>
           <a:p>
             <a:pPr lvl="0"/>
             <a:r>
               <a:rPr lang="en-US" dirty="0"/>
-              <a:t>Click to edit Master </a:t>
-            </a:r>
-            <a:r>
-              <a:rPr lang="en-US"/>
-              <a:t>text styles</a:t>
-            </a:r>
-            <a:endParaRPr lang="en-US" dirty="0"/>
+              <a:t>Click to edit Master text styles</a:t>
+            </a:r>
           </a:p>
         </p:txBody>
       </p:sp>
@@ -6042,13 +6035,13 @@
   <p:clrMapOvr>
     <a:masterClrMapping/>
   </p:clrMapOvr>
-  <mc:AlternateContent xmlns:mc="http://schemas.openxmlformats.org/markup-compatibility/2006">
-    <mc:Choice xmlns:p14="http://schemas.microsoft.com/office/powerpoint/2010/main" Requires="p14">
+  <mc:AlternateContent xmlns:mc="http://schemas.openxmlformats.org/markup-compatibility/2006" xmlns:p14="http://schemas.microsoft.com/office/powerpoint/2010/main">
+    <mc:Choice Requires="p14">
       <p:transition p14:dur="250">
         <p:fade/>
       </p:transition>
     </mc:Choice>
-    <mc:Fallback>
+    <mc:Fallback xmlns="">
       <p:transition>
         <p:fade/>
       </p:transition>
@@ -6103,13 +6096,13 @@
   <p:clrMapOvr>
     <a:masterClrMapping/>
   </p:clrMapOvr>
-  <mc:AlternateContent xmlns:mc="http://schemas.openxmlformats.org/markup-compatibility/2006">
-    <mc:Choice xmlns:p14="http://schemas.microsoft.com/office/powerpoint/2010/main" Requires="p14">
+  <mc:AlternateContent xmlns:mc="http://schemas.openxmlformats.org/markup-compatibility/2006" xmlns:p14="http://schemas.microsoft.com/office/powerpoint/2010/main">
+    <mc:Choice Requires="p14">
       <p:transition spd="med" p14:dur="700">
         <p:fade/>
       </p:transition>
     </mc:Choice>
-    <mc:Fallback>
+    <mc:Fallback xmlns="">
       <p:transition spd="med">
         <p:fade/>
       </p:transition>
@@ -6204,13 +6197,13 @@
   <p:clrMapOvr>
     <a:masterClrMapping/>
   </p:clrMapOvr>
-  <mc:AlternateContent xmlns:mc="http://schemas.openxmlformats.org/markup-compatibility/2006">
-    <mc:Choice xmlns:p14="http://schemas.microsoft.com/office/powerpoint/2010/main" Requires="p14">
+  <mc:AlternateContent xmlns:mc="http://schemas.openxmlformats.org/markup-compatibility/2006" xmlns:p14="http://schemas.microsoft.com/office/powerpoint/2010/main">
+    <mc:Choice Requires="p14">
       <p:transition spd="med" p14:dur="700">
         <p:fade/>
       </p:transition>
     </mc:Choice>
-    <mc:Fallback>
+    <mc:Fallback xmlns="">
       <p:transition spd="med">
         <p:fade/>
       </p:transition>
@@ -7995,13 +7988,13 @@
   <p:clrMapOvr>
     <a:masterClrMapping/>
   </p:clrMapOvr>
-  <mc:AlternateContent xmlns:mc="http://schemas.openxmlformats.org/markup-compatibility/2006">
-    <mc:Choice xmlns:p14="http://schemas.microsoft.com/office/powerpoint/2010/main" Requires="p14">
+  <mc:AlternateContent xmlns:mc="http://schemas.openxmlformats.org/markup-compatibility/2006" xmlns:p14="http://schemas.microsoft.com/office/powerpoint/2010/main">
+    <mc:Choice Requires="p14">
       <p:transition spd="med" p14:dur="700">
         <p:fade/>
       </p:transition>
     </mc:Choice>
-    <mc:Fallback>
+    <mc:Fallback xmlns="">
       <p:transition spd="med">
         <p:fade/>
       </p:transition>

</xml_diff>

<commit_message>
General Improvements and Additional debug help
</commit_message>
<xml_diff>
--- a/app/data/Remaja_template.pptx
+++ b/app/data/Remaja_template.pptx
@@ -5872,8 +5872,8 @@
         </p:nvSpPr>
         <p:spPr>
           <a:xfrm>
-            <a:off x="6453809" y="1063894"/>
-            <a:ext cx="3578088" cy="365760"/>
+            <a:off x="4704522" y="1063894"/>
+            <a:ext cx="7138482" cy="365760"/>
           </a:xfrm>
         </p:spPr>
         <p:txBody>

</xml_diff>

<commit_message>
Fix bugs and add songs
</commit_message>
<xml_diff>
--- a/app/data/Remaja_template.pptx
+++ b/app/data/Remaja_template.pptx
@@ -1107,548 +1107,71 @@
       </p:sp>
       <p:sp>
         <p:nvSpPr>
-          <p:cNvPr id="2" name="TextBox 1">
+          <p:cNvPr id="7" name="Text Placeholder 6">
             <a:extLst>
               <a:ext uri="{FF2B5EF4-FFF2-40B4-BE49-F238E27FC236}">
-                <a16:creationId xmlns:a16="http://schemas.microsoft.com/office/drawing/2014/main" id="{15128349-EDC6-A4A0-8CCE-E4571CCE4BDA}"/>
+                <a16:creationId xmlns:a16="http://schemas.microsoft.com/office/drawing/2014/main" id="{E7455EE9-8C26-0622-C6A5-1427E3E21E7E}"/>
               </a:ext>
             </a:extLst>
           </p:cNvPr>
-          <p:cNvSpPr txBox="1"/>
-          <p:nvPr userDrawn="1"/>
+          <p:cNvSpPr>
+            <a:spLocks noGrp="1"/>
+          </p:cNvSpPr>
+          <p:nvPr>
+            <p:ph type="body" sz="quarter" idx="10"/>
+          </p:nvPr>
         </p:nvSpPr>
         <p:spPr>
           <a:xfrm>
-            <a:off x="927652" y="1052391"/>
-            <a:ext cx="10336696" cy="5476139"/>
+            <a:off x="1057275" y="902138"/>
+            <a:ext cx="10069513" cy="5165725"/>
           </a:xfrm>
-          <a:prstGeom prst="rect">
-            <a:avLst/>
-          </a:prstGeom>
-          <a:noFill/>
         </p:spPr>
         <p:txBody>
-          <a:bodyPr wrap="square">
-            <a:spAutoFit/>
-          </a:bodyPr>
-          <a:lstStyle/>
-          <a:p>
-            <a:r>
-              <a:rPr lang="en-US" sz="3200" dirty="0" err="1">
+          <a:bodyPr/>
+          <a:lstStyle>
+            <a:lvl1pPr marL="50800" indent="0">
+              <a:buNone/>
+              <a:defRPr sz="2700">
                 <a:latin typeface="Lato" panose="020F0502020204030203" pitchFamily="34" charset="0"/>
                 <a:ea typeface="Lato" panose="020F0502020204030203" pitchFamily="34" charset="0"/>
                 <a:cs typeface="Lato" panose="020F0502020204030203" pitchFamily="34" charset="0"/>
-              </a:rPr>
-              <a:t>Selamat</a:t>
-            </a:r>
-            <a:r>
-              <a:rPr lang="en-US" sz="3200" dirty="0">
+              </a:defRPr>
+            </a:lvl1pPr>
+            <a:lvl2pPr>
+              <a:defRPr sz="3100">
                 <a:latin typeface="Lato" panose="020F0502020204030203" pitchFamily="34" charset="0"/>
                 <a:ea typeface="Lato" panose="020F0502020204030203" pitchFamily="34" charset="0"/>
                 <a:cs typeface="Lato" panose="020F0502020204030203" pitchFamily="34" charset="0"/>
-              </a:rPr>
-              <a:t> </a:t>
-            </a:r>
-            <a:r>
-              <a:rPr lang="en-US" sz="3200" dirty="0" err="1">
+              </a:defRPr>
+            </a:lvl2pPr>
+            <a:lvl3pPr>
+              <a:defRPr sz="3100">
                 <a:latin typeface="Lato" panose="020F0502020204030203" pitchFamily="34" charset="0"/>
                 <a:ea typeface="Lato" panose="020F0502020204030203" pitchFamily="34" charset="0"/>
                 <a:cs typeface="Lato" panose="020F0502020204030203" pitchFamily="34" charset="0"/>
-              </a:rPr>
-              <a:t>ulang</a:t>
-            </a:r>
-            <a:r>
-              <a:rPr lang="en-US" sz="3200" dirty="0">
+              </a:defRPr>
+            </a:lvl3pPr>
+            <a:lvl4pPr>
+              <a:defRPr sz="3100">
                 <a:latin typeface="Lato" panose="020F0502020204030203" pitchFamily="34" charset="0"/>
                 <a:ea typeface="Lato" panose="020F0502020204030203" pitchFamily="34" charset="0"/>
                 <a:cs typeface="Lato" panose="020F0502020204030203" pitchFamily="34" charset="0"/>
-              </a:rPr>
-              <a:t> </a:t>
-            </a:r>
-            <a:r>
-              <a:rPr lang="en-US" sz="3200" dirty="0" err="1">
+              </a:defRPr>
+            </a:lvl4pPr>
+            <a:lvl5pPr>
+              <a:defRPr sz="3100">
                 <a:latin typeface="Lato" panose="020F0502020204030203" pitchFamily="34" charset="0"/>
                 <a:ea typeface="Lato" panose="020F0502020204030203" pitchFamily="34" charset="0"/>
                 <a:cs typeface="Lato" panose="020F0502020204030203" pitchFamily="34" charset="0"/>
-              </a:rPr>
-              <a:t>tahun</a:t>
-            </a:r>
+              </a:defRPr>
+            </a:lvl5pPr>
+          </a:lstStyle>
+          <a:p>
+            <a:pPr lvl="0"/>
             <a:r>
-              <a:rPr lang="en-US" sz="3200" dirty="0">
-                <a:latin typeface="Lato" panose="020F0502020204030203" pitchFamily="34" charset="0"/>
-                <a:ea typeface="Lato" panose="020F0502020204030203" pitchFamily="34" charset="0"/>
-                <a:cs typeface="Lato" panose="020F0502020204030203" pitchFamily="34" charset="0"/>
-              </a:rPr>
-              <a:t>,</a:t>
-            </a:r>
-          </a:p>
-          <a:p>
-            <a:r>
-              <a:rPr lang="en-US" sz="3200" dirty="0">
-                <a:latin typeface="Lato" panose="020F0502020204030203" pitchFamily="34" charset="0"/>
-                <a:ea typeface="Lato" panose="020F0502020204030203" pitchFamily="34" charset="0"/>
-                <a:cs typeface="Lato" panose="020F0502020204030203" pitchFamily="34" charset="0"/>
-              </a:rPr>
-              <a:t>Kami </a:t>
-            </a:r>
-            <a:r>
-              <a:rPr lang="en-US" sz="3200" dirty="0" err="1">
-                <a:latin typeface="Lato" panose="020F0502020204030203" pitchFamily="34" charset="0"/>
-                <a:ea typeface="Lato" panose="020F0502020204030203" pitchFamily="34" charset="0"/>
-                <a:cs typeface="Lato" panose="020F0502020204030203" pitchFamily="34" charset="0"/>
-              </a:rPr>
-              <a:t>ucapkan</a:t>
-            </a:r>
-            <a:r>
-              <a:rPr lang="en-US" sz="3200" dirty="0">
-                <a:latin typeface="Lato" panose="020F0502020204030203" pitchFamily="34" charset="0"/>
-                <a:ea typeface="Lato" panose="020F0502020204030203" pitchFamily="34" charset="0"/>
-                <a:cs typeface="Lato" panose="020F0502020204030203" pitchFamily="34" charset="0"/>
-              </a:rPr>
-              <a:t> </a:t>
-            </a:r>
-            <a:r>
-              <a:rPr lang="en-US" sz="3200" dirty="0" err="1">
-                <a:latin typeface="Lato" panose="020F0502020204030203" pitchFamily="34" charset="0"/>
-                <a:ea typeface="Lato" panose="020F0502020204030203" pitchFamily="34" charset="0"/>
-                <a:cs typeface="Lato" panose="020F0502020204030203" pitchFamily="34" charset="0"/>
-              </a:rPr>
-              <a:t>padamu</a:t>
-            </a:r>
-            <a:r>
-              <a:rPr lang="en-US" sz="3200" dirty="0">
-                <a:latin typeface="Lato" panose="020F0502020204030203" pitchFamily="34" charset="0"/>
-                <a:ea typeface="Lato" panose="020F0502020204030203" pitchFamily="34" charset="0"/>
-                <a:cs typeface="Lato" panose="020F0502020204030203" pitchFamily="34" charset="0"/>
-              </a:rPr>
-              <a:t>.</a:t>
-            </a:r>
-          </a:p>
-          <a:p>
-            <a:r>
-              <a:rPr lang="en-US" sz="3200" dirty="0" err="1">
-                <a:latin typeface="Lato" panose="020F0502020204030203" pitchFamily="34" charset="0"/>
-                <a:ea typeface="Lato" panose="020F0502020204030203" pitchFamily="34" charset="0"/>
-                <a:cs typeface="Lato" panose="020F0502020204030203" pitchFamily="34" charset="0"/>
-              </a:rPr>
-              <a:t>Selamat</a:t>
-            </a:r>
-            <a:r>
-              <a:rPr lang="en-US" sz="3200" dirty="0">
-                <a:latin typeface="Lato" panose="020F0502020204030203" pitchFamily="34" charset="0"/>
-                <a:ea typeface="Lato" panose="020F0502020204030203" pitchFamily="34" charset="0"/>
-                <a:cs typeface="Lato" panose="020F0502020204030203" pitchFamily="34" charset="0"/>
-              </a:rPr>
-              <a:t> </a:t>
-            </a:r>
-            <a:r>
-              <a:rPr lang="en-US" sz="3200" dirty="0" err="1">
-                <a:latin typeface="Lato" panose="020F0502020204030203" pitchFamily="34" charset="0"/>
-                <a:ea typeface="Lato" panose="020F0502020204030203" pitchFamily="34" charset="0"/>
-                <a:cs typeface="Lato" panose="020F0502020204030203" pitchFamily="34" charset="0"/>
-              </a:rPr>
-              <a:t>hari</a:t>
-            </a:r>
-            <a:r>
-              <a:rPr lang="en-US" sz="3200" dirty="0">
-                <a:latin typeface="Lato" panose="020F0502020204030203" pitchFamily="34" charset="0"/>
-                <a:ea typeface="Lato" panose="020F0502020204030203" pitchFamily="34" charset="0"/>
-                <a:cs typeface="Lato" panose="020F0502020204030203" pitchFamily="34" charset="0"/>
-              </a:rPr>
-              <a:t> </a:t>
-            </a:r>
-            <a:r>
-              <a:rPr lang="en-US" sz="3200" dirty="0" err="1">
-                <a:latin typeface="Lato" panose="020F0502020204030203" pitchFamily="34" charset="0"/>
-                <a:ea typeface="Lato" panose="020F0502020204030203" pitchFamily="34" charset="0"/>
-                <a:cs typeface="Lato" panose="020F0502020204030203" pitchFamily="34" charset="0"/>
-              </a:rPr>
-              <a:t>jadi</a:t>
-            </a:r>
-            <a:r>
-              <a:rPr lang="en-US" sz="3200" dirty="0">
-                <a:latin typeface="Lato" panose="020F0502020204030203" pitchFamily="34" charset="0"/>
-                <a:ea typeface="Lato" panose="020F0502020204030203" pitchFamily="34" charset="0"/>
-                <a:cs typeface="Lato" panose="020F0502020204030203" pitchFamily="34" charset="0"/>
-              </a:rPr>
-              <a:t>, </a:t>
-            </a:r>
-          </a:p>
-          <a:p>
-            <a:r>
-              <a:rPr lang="en-US" sz="3200" dirty="0" err="1">
-                <a:latin typeface="Lato" panose="020F0502020204030203" pitchFamily="34" charset="0"/>
-                <a:ea typeface="Lato" panose="020F0502020204030203" pitchFamily="34" charset="0"/>
-                <a:cs typeface="Lato" panose="020F0502020204030203" pitchFamily="34" charset="0"/>
-              </a:rPr>
-              <a:t>Tuhan</a:t>
-            </a:r>
-            <a:r>
-              <a:rPr lang="en-US" sz="3200" dirty="0">
-                <a:latin typeface="Lato" panose="020F0502020204030203" pitchFamily="34" charset="0"/>
-                <a:ea typeface="Lato" panose="020F0502020204030203" pitchFamily="34" charset="0"/>
-                <a:cs typeface="Lato" panose="020F0502020204030203" pitchFamily="34" charset="0"/>
-              </a:rPr>
-              <a:t> </a:t>
-            </a:r>
-            <a:r>
-              <a:rPr lang="en-US" sz="3200" dirty="0" err="1">
-                <a:latin typeface="Lato" panose="020F0502020204030203" pitchFamily="34" charset="0"/>
-                <a:ea typeface="Lato" panose="020F0502020204030203" pitchFamily="34" charset="0"/>
-                <a:cs typeface="Lato" panose="020F0502020204030203" pitchFamily="34" charset="0"/>
-              </a:rPr>
-              <a:t>Yesus</a:t>
-            </a:r>
-            <a:r>
-              <a:rPr lang="en-US" sz="3200" dirty="0">
-                <a:latin typeface="Lato" panose="020F0502020204030203" pitchFamily="34" charset="0"/>
-                <a:ea typeface="Lato" panose="020F0502020204030203" pitchFamily="34" charset="0"/>
-                <a:cs typeface="Lato" panose="020F0502020204030203" pitchFamily="34" charset="0"/>
-              </a:rPr>
-              <a:t> </a:t>
-            </a:r>
-            <a:r>
-              <a:rPr lang="en-US" sz="3200" dirty="0" err="1">
-                <a:latin typeface="Lato" panose="020F0502020204030203" pitchFamily="34" charset="0"/>
-                <a:ea typeface="Lato" panose="020F0502020204030203" pitchFamily="34" charset="0"/>
-                <a:cs typeface="Lato" panose="020F0502020204030203" pitchFamily="34" charset="0"/>
-              </a:rPr>
-              <a:t>memberkati</a:t>
-            </a:r>
-            <a:r>
-              <a:rPr lang="en-US" sz="3200" dirty="0">
-                <a:latin typeface="Lato" panose="020F0502020204030203" pitchFamily="34" charset="0"/>
-                <a:ea typeface="Lato" panose="020F0502020204030203" pitchFamily="34" charset="0"/>
-                <a:cs typeface="Lato" panose="020F0502020204030203" pitchFamily="34" charset="0"/>
-              </a:rPr>
-              <a:t>.</a:t>
-            </a:r>
-          </a:p>
-          <a:p>
-            <a:endParaRPr lang="en-US" sz="3200" dirty="0">
-              <a:latin typeface="Lato" panose="020F0502020204030203" pitchFamily="34" charset="0"/>
-              <a:ea typeface="Lato" panose="020F0502020204030203" pitchFamily="34" charset="0"/>
-              <a:cs typeface="Lato" panose="020F0502020204030203" pitchFamily="34" charset="0"/>
-            </a:endParaRPr>
-          </a:p>
-          <a:p>
-            <a:r>
-              <a:rPr lang="en-US" sz="3200" dirty="0">
-                <a:latin typeface="Lato" panose="020F0502020204030203" pitchFamily="34" charset="0"/>
-                <a:ea typeface="Lato" panose="020F0502020204030203" pitchFamily="34" charset="0"/>
-                <a:cs typeface="Lato" panose="020F0502020204030203" pitchFamily="34" charset="0"/>
-              </a:rPr>
-              <a:t>Kami </a:t>
-            </a:r>
-            <a:r>
-              <a:rPr lang="en-US" sz="3200" dirty="0" err="1">
-                <a:latin typeface="Lato" panose="020F0502020204030203" pitchFamily="34" charset="0"/>
-                <a:ea typeface="Lato" panose="020F0502020204030203" pitchFamily="34" charset="0"/>
-                <a:cs typeface="Lato" panose="020F0502020204030203" pitchFamily="34" charset="0"/>
-              </a:rPr>
-              <a:t>s'lalu</a:t>
-            </a:r>
-            <a:r>
-              <a:rPr lang="en-US" sz="3200" dirty="0">
-                <a:latin typeface="Lato" panose="020F0502020204030203" pitchFamily="34" charset="0"/>
-                <a:ea typeface="Lato" panose="020F0502020204030203" pitchFamily="34" charset="0"/>
-                <a:cs typeface="Lato" panose="020F0502020204030203" pitchFamily="34" charset="0"/>
-              </a:rPr>
-              <a:t> </a:t>
-            </a:r>
-            <a:r>
-              <a:rPr lang="en-US" sz="3200" dirty="0" err="1">
-                <a:latin typeface="Lato" panose="020F0502020204030203" pitchFamily="34" charset="0"/>
-                <a:ea typeface="Lato" panose="020F0502020204030203" pitchFamily="34" charset="0"/>
-                <a:cs typeface="Lato" panose="020F0502020204030203" pitchFamily="34" charset="0"/>
-              </a:rPr>
-              <a:t>berdoa</a:t>
-            </a:r>
-            <a:endParaRPr lang="en-US" sz="3200" dirty="0">
-              <a:latin typeface="Lato" panose="020F0502020204030203" pitchFamily="34" charset="0"/>
-              <a:ea typeface="Lato" panose="020F0502020204030203" pitchFamily="34" charset="0"/>
-              <a:cs typeface="Lato" panose="020F0502020204030203" pitchFamily="34" charset="0"/>
-            </a:endParaRPr>
-          </a:p>
-          <a:p>
-            <a:r>
-              <a:rPr lang="en-US" sz="3200" dirty="0">
-                <a:latin typeface="Lato" panose="020F0502020204030203" pitchFamily="34" charset="0"/>
-                <a:ea typeface="Lato" panose="020F0502020204030203" pitchFamily="34" charset="0"/>
-                <a:cs typeface="Lato" panose="020F0502020204030203" pitchFamily="34" charset="0"/>
-              </a:rPr>
-              <a:t>Agar kau </a:t>
-            </a:r>
-            <a:r>
-              <a:rPr lang="en-US" sz="3200" dirty="0" err="1">
-                <a:latin typeface="Lato" panose="020F0502020204030203" pitchFamily="34" charset="0"/>
-                <a:ea typeface="Lato" panose="020F0502020204030203" pitchFamily="34" charset="0"/>
-                <a:cs typeface="Lato" panose="020F0502020204030203" pitchFamily="34" charset="0"/>
-              </a:rPr>
-              <a:t>tetap</a:t>
-            </a:r>
-            <a:r>
-              <a:rPr lang="en-US" sz="3200" dirty="0">
-                <a:latin typeface="Lato" panose="020F0502020204030203" pitchFamily="34" charset="0"/>
-                <a:ea typeface="Lato" panose="020F0502020204030203" pitchFamily="34" charset="0"/>
-                <a:cs typeface="Lato" panose="020F0502020204030203" pitchFamily="34" charset="0"/>
-              </a:rPr>
-              <a:t> </a:t>
-            </a:r>
-            <a:r>
-              <a:rPr lang="en-US" sz="3200" dirty="0" err="1">
-                <a:latin typeface="Lato" panose="020F0502020204030203" pitchFamily="34" charset="0"/>
-                <a:ea typeface="Lato" panose="020F0502020204030203" pitchFamily="34" charset="0"/>
-                <a:cs typeface="Lato" panose="020F0502020204030203" pitchFamily="34" charset="0"/>
-              </a:rPr>
-              <a:t>setia</a:t>
-            </a:r>
-            <a:endParaRPr lang="en-US" sz="3200" dirty="0">
-              <a:latin typeface="Lato" panose="020F0502020204030203" pitchFamily="34" charset="0"/>
-              <a:ea typeface="Lato" panose="020F0502020204030203" pitchFamily="34" charset="0"/>
-              <a:cs typeface="Lato" panose="020F0502020204030203" pitchFamily="34" charset="0"/>
-            </a:endParaRPr>
-          </a:p>
-          <a:p>
-            <a:r>
-              <a:rPr lang="en-US" sz="3200" dirty="0">
-                <a:latin typeface="Lato" panose="020F0502020204030203" pitchFamily="34" charset="0"/>
-                <a:ea typeface="Lato" panose="020F0502020204030203" pitchFamily="34" charset="0"/>
-                <a:cs typeface="Lato" panose="020F0502020204030203" pitchFamily="34" charset="0"/>
-              </a:rPr>
-              <a:t>Pada </a:t>
-            </a:r>
-            <a:r>
-              <a:rPr lang="en-US" sz="3200" dirty="0" err="1">
-                <a:latin typeface="Lato" panose="020F0502020204030203" pitchFamily="34" charset="0"/>
-                <a:ea typeface="Lato" panose="020F0502020204030203" pitchFamily="34" charset="0"/>
-                <a:cs typeface="Lato" panose="020F0502020204030203" pitchFamily="34" charset="0"/>
-              </a:rPr>
-              <a:t>Yesus</a:t>
-            </a:r>
-            <a:r>
-              <a:rPr lang="en-US" sz="3200" dirty="0">
-                <a:latin typeface="Lato" panose="020F0502020204030203" pitchFamily="34" charset="0"/>
-                <a:ea typeface="Lato" panose="020F0502020204030203" pitchFamily="34" charset="0"/>
-                <a:cs typeface="Lato" panose="020F0502020204030203" pitchFamily="34" charset="0"/>
-              </a:rPr>
-              <a:t> </a:t>
-            </a:r>
-            <a:r>
-              <a:rPr lang="en-US" sz="3200" dirty="0" err="1">
-                <a:latin typeface="Lato" panose="020F0502020204030203" pitchFamily="34" charset="0"/>
-                <a:ea typeface="Lato" panose="020F0502020204030203" pitchFamily="34" charset="0"/>
-                <a:cs typeface="Lato" panose="020F0502020204030203" pitchFamily="34" charset="0"/>
-              </a:rPr>
-              <a:t>Kristus</a:t>
-            </a:r>
-            <a:r>
-              <a:rPr lang="en-US" sz="3200" dirty="0">
-                <a:latin typeface="Lato" panose="020F0502020204030203" pitchFamily="34" charset="0"/>
-                <a:ea typeface="Lato" panose="020F0502020204030203" pitchFamily="34" charset="0"/>
-                <a:cs typeface="Lato" panose="020F0502020204030203" pitchFamily="34" charset="0"/>
-              </a:rPr>
-              <a:t>, </a:t>
-            </a:r>
-            <a:r>
-              <a:rPr lang="en-US" sz="3200" dirty="0" err="1">
-                <a:latin typeface="Lato" panose="020F0502020204030203" pitchFamily="34" charset="0"/>
-                <a:ea typeface="Lato" panose="020F0502020204030203" pitchFamily="34" charset="0"/>
-                <a:cs typeface="Lato" panose="020F0502020204030203" pitchFamily="34" charset="0"/>
-              </a:rPr>
-              <a:t>Tuhan</a:t>
-            </a:r>
-            <a:r>
-              <a:rPr lang="en-US" sz="3200" dirty="0">
-                <a:latin typeface="Lato" panose="020F0502020204030203" pitchFamily="34" charset="0"/>
-                <a:ea typeface="Lato" panose="020F0502020204030203" pitchFamily="34" charset="0"/>
-                <a:cs typeface="Lato" panose="020F0502020204030203" pitchFamily="34" charset="0"/>
-              </a:rPr>
-              <a:t> dan Raja </a:t>
-            </a:r>
-            <a:r>
-              <a:rPr lang="en-US" sz="3200" dirty="0" err="1">
-                <a:latin typeface="Lato" panose="020F0502020204030203" pitchFamily="34" charset="0"/>
-                <a:ea typeface="Lato" panose="020F0502020204030203" pitchFamily="34" charset="0"/>
-                <a:cs typeface="Lato" panose="020F0502020204030203" pitchFamily="34" charset="0"/>
-              </a:rPr>
-              <a:t>kita</a:t>
-            </a:r>
-            <a:r>
-              <a:rPr lang="en-US" sz="3200" dirty="0">
-                <a:latin typeface="Lato" panose="020F0502020204030203" pitchFamily="34" charset="0"/>
-                <a:ea typeface="Lato" panose="020F0502020204030203" pitchFamily="34" charset="0"/>
-                <a:cs typeface="Lato" panose="020F0502020204030203" pitchFamily="34" charset="0"/>
-              </a:rPr>
-              <a:t>, oh.</a:t>
-            </a:r>
-          </a:p>
-          <a:p>
-            <a:r>
-              <a:rPr lang="en-US" sz="3200" dirty="0">
-                <a:latin typeface="Lato" panose="020F0502020204030203" pitchFamily="34" charset="0"/>
-                <a:ea typeface="Lato" panose="020F0502020204030203" pitchFamily="34" charset="0"/>
-                <a:cs typeface="Lato" panose="020F0502020204030203" pitchFamily="34" charset="0"/>
-              </a:rPr>
-              <a:t>Kami </a:t>
-            </a:r>
-            <a:r>
-              <a:rPr lang="en-US" sz="3200" dirty="0" err="1">
-                <a:latin typeface="Lato" panose="020F0502020204030203" pitchFamily="34" charset="0"/>
-                <a:ea typeface="Lato" panose="020F0502020204030203" pitchFamily="34" charset="0"/>
-                <a:cs typeface="Lato" panose="020F0502020204030203" pitchFamily="34" charset="0"/>
-              </a:rPr>
-              <a:t>mengucap</a:t>
-            </a:r>
-            <a:r>
-              <a:rPr lang="en-US" sz="3200" dirty="0">
-                <a:latin typeface="Lato" panose="020F0502020204030203" pitchFamily="34" charset="0"/>
-                <a:ea typeface="Lato" panose="020F0502020204030203" pitchFamily="34" charset="0"/>
-                <a:cs typeface="Lato" panose="020F0502020204030203" pitchFamily="34" charset="0"/>
-              </a:rPr>
-              <a:t> </a:t>
-            </a:r>
-            <a:r>
-              <a:rPr lang="en-US" sz="3200" dirty="0" err="1">
-                <a:latin typeface="Lato" panose="020F0502020204030203" pitchFamily="34" charset="0"/>
-                <a:ea typeface="Lato" panose="020F0502020204030203" pitchFamily="34" charset="0"/>
-                <a:cs typeface="Lato" panose="020F0502020204030203" pitchFamily="34" charset="0"/>
-              </a:rPr>
-              <a:t>syukur</a:t>
-            </a:r>
-            <a:endParaRPr lang="en-US" sz="3200" dirty="0">
-              <a:latin typeface="Lato" panose="020F0502020204030203" pitchFamily="34" charset="0"/>
-              <a:ea typeface="Lato" panose="020F0502020204030203" pitchFamily="34" charset="0"/>
-              <a:cs typeface="Lato" panose="020F0502020204030203" pitchFamily="34" charset="0"/>
-            </a:endParaRPr>
-          </a:p>
-          <a:p>
-            <a:r>
-              <a:rPr lang="en-US" sz="3200" dirty="0" err="1">
-                <a:latin typeface="Lato" panose="020F0502020204030203" pitchFamily="34" charset="0"/>
-                <a:ea typeface="Lato" panose="020F0502020204030203" pitchFamily="34" charset="0"/>
-                <a:cs typeface="Lato" panose="020F0502020204030203" pitchFamily="34" charset="0"/>
-              </a:rPr>
-              <a:t>Tuhan</a:t>
-            </a:r>
-            <a:r>
-              <a:rPr lang="en-US" sz="3200" dirty="0">
-                <a:latin typeface="Lato" panose="020F0502020204030203" pitchFamily="34" charset="0"/>
-                <a:ea typeface="Lato" panose="020F0502020204030203" pitchFamily="34" charset="0"/>
-                <a:cs typeface="Lato" panose="020F0502020204030203" pitchFamily="34" charset="0"/>
-              </a:rPr>
-              <a:t> </a:t>
-            </a:r>
-            <a:r>
-              <a:rPr lang="en-US" sz="3200" dirty="0" err="1">
-                <a:latin typeface="Lato" panose="020F0502020204030203" pitchFamily="34" charset="0"/>
-                <a:ea typeface="Lato" panose="020F0502020204030203" pitchFamily="34" charset="0"/>
-                <a:cs typeface="Lato" panose="020F0502020204030203" pitchFamily="34" charset="0"/>
-              </a:rPr>
-              <a:t>t'lah</a:t>
-            </a:r>
-            <a:r>
-              <a:rPr lang="en-US" sz="3200" dirty="0">
-                <a:latin typeface="Lato" panose="020F0502020204030203" pitchFamily="34" charset="0"/>
-                <a:ea typeface="Lato" panose="020F0502020204030203" pitchFamily="34" charset="0"/>
-                <a:cs typeface="Lato" panose="020F0502020204030203" pitchFamily="34" charset="0"/>
-              </a:rPr>
-              <a:t> </a:t>
-            </a:r>
-            <a:r>
-              <a:rPr lang="en-US" sz="3200" dirty="0" err="1">
-                <a:latin typeface="Lato" panose="020F0502020204030203" pitchFamily="34" charset="0"/>
-                <a:ea typeface="Lato" panose="020F0502020204030203" pitchFamily="34" charset="0"/>
-                <a:cs typeface="Lato" panose="020F0502020204030203" pitchFamily="34" charset="0"/>
-              </a:rPr>
-              <a:t>pimpin</a:t>
-            </a:r>
-            <a:r>
-              <a:rPr lang="en-US" sz="3200" dirty="0">
-                <a:latin typeface="Lato" panose="020F0502020204030203" pitchFamily="34" charset="0"/>
-                <a:ea typeface="Lato" panose="020F0502020204030203" pitchFamily="34" charset="0"/>
-                <a:cs typeface="Lato" panose="020F0502020204030203" pitchFamily="34" charset="0"/>
-              </a:rPr>
-              <a:t> </a:t>
-            </a:r>
-            <a:r>
-              <a:rPr lang="en-US" sz="3200" dirty="0" err="1">
-                <a:latin typeface="Lato" panose="020F0502020204030203" pitchFamily="34" charset="0"/>
-                <a:ea typeface="Lato" panose="020F0502020204030203" pitchFamily="34" charset="0"/>
-                <a:cs typeface="Lato" panose="020F0502020204030203" pitchFamily="34" charset="0"/>
-              </a:rPr>
-              <a:t>langkahmu</a:t>
-            </a:r>
-            <a:endParaRPr lang="en-US" sz="3200" dirty="0">
-              <a:latin typeface="Lato" panose="020F0502020204030203" pitchFamily="34" charset="0"/>
-              <a:ea typeface="Lato" panose="020F0502020204030203" pitchFamily="34" charset="0"/>
-              <a:cs typeface="Lato" panose="020F0502020204030203" pitchFamily="34" charset="0"/>
-            </a:endParaRPr>
-          </a:p>
-          <a:p>
-            <a:r>
-              <a:rPr lang="en-US" sz="3200" dirty="0" err="1">
-                <a:latin typeface="Lato" panose="020F0502020204030203" pitchFamily="34" charset="0"/>
-                <a:ea typeface="Lato" panose="020F0502020204030203" pitchFamily="34" charset="0"/>
-                <a:cs typeface="Lato" panose="020F0502020204030203" pitchFamily="34" charset="0"/>
-              </a:rPr>
-              <a:t>Padamu</a:t>
-            </a:r>
-            <a:r>
-              <a:rPr lang="en-US" sz="3200" dirty="0">
-                <a:latin typeface="Lato" panose="020F0502020204030203" pitchFamily="34" charset="0"/>
-                <a:ea typeface="Lato" panose="020F0502020204030203" pitchFamily="34" charset="0"/>
-                <a:cs typeface="Lato" panose="020F0502020204030203" pitchFamily="34" charset="0"/>
-              </a:rPr>
-              <a:t> [insert name], </a:t>
-            </a:r>
-            <a:r>
-              <a:rPr lang="en-US" sz="3200" dirty="0" err="1">
-                <a:latin typeface="Lato" panose="020F0502020204030203" pitchFamily="34" charset="0"/>
-                <a:ea typeface="Lato" panose="020F0502020204030203" pitchFamily="34" charset="0"/>
-                <a:cs typeface="Lato" panose="020F0502020204030203" pitchFamily="34" charset="0"/>
-              </a:rPr>
-              <a:t>selamat</a:t>
-            </a:r>
-            <a:r>
-              <a:rPr lang="en-US" sz="3200" dirty="0">
-                <a:latin typeface="Lato" panose="020F0502020204030203" pitchFamily="34" charset="0"/>
-                <a:ea typeface="Lato" panose="020F0502020204030203" pitchFamily="34" charset="0"/>
-                <a:cs typeface="Lato" panose="020F0502020204030203" pitchFamily="34" charset="0"/>
-              </a:rPr>
-              <a:t> </a:t>
-            </a:r>
-            <a:r>
-              <a:rPr lang="en-US" sz="3200" dirty="0" err="1">
-                <a:latin typeface="Lato" panose="020F0502020204030203" pitchFamily="34" charset="0"/>
-                <a:ea typeface="Lato" panose="020F0502020204030203" pitchFamily="34" charset="0"/>
-                <a:cs typeface="Lato" panose="020F0502020204030203" pitchFamily="34" charset="0"/>
-              </a:rPr>
-              <a:t>ulang</a:t>
-            </a:r>
-            <a:r>
-              <a:rPr lang="en-US" sz="3200" dirty="0">
-                <a:latin typeface="Lato" panose="020F0502020204030203" pitchFamily="34" charset="0"/>
-                <a:ea typeface="Lato" panose="020F0502020204030203" pitchFamily="34" charset="0"/>
-                <a:cs typeface="Lato" panose="020F0502020204030203" pitchFamily="34" charset="0"/>
-              </a:rPr>
-              <a:t> </a:t>
-            </a:r>
-            <a:r>
-              <a:rPr lang="en-US" sz="3200" dirty="0" err="1">
-                <a:latin typeface="Lato" panose="020F0502020204030203" pitchFamily="34" charset="0"/>
-                <a:ea typeface="Lato" panose="020F0502020204030203" pitchFamily="34" charset="0"/>
-                <a:cs typeface="Lato" panose="020F0502020204030203" pitchFamily="34" charset="0"/>
-              </a:rPr>
-              <a:t>tahun</a:t>
-            </a:r>
-            <a:r>
-              <a:rPr lang="en-US" sz="3200" dirty="0">
-                <a:latin typeface="Lato" panose="020F0502020204030203" pitchFamily="34" charset="0"/>
-                <a:ea typeface="Lato" panose="020F0502020204030203" pitchFamily="34" charset="0"/>
-                <a:cs typeface="Lato" panose="020F0502020204030203" pitchFamily="34" charset="0"/>
-              </a:rPr>
-              <a:t>!</a:t>
+              <a:rPr lang="en-US" dirty="0"/>
+              <a:t>Click to edit Master text styles</a:t>
             </a:r>
           </a:p>
         </p:txBody>
@@ -2459,7 +1982,7 @@
             </a:lvl9pPr>
           </a:lstStyle>
           <a:p>
-            <a:endParaRPr/>
+            <a:endParaRPr dirty="0"/>
           </a:p>
         </p:txBody>
       </p:sp>
@@ -2914,7 +2437,7 @@
             </a:lvl9pPr>
           </a:lstStyle>
           <a:p>
-            <a:endParaRPr/>
+            <a:endParaRPr dirty="0"/>
           </a:p>
         </p:txBody>
       </p:sp>
@@ -5829,8 +5352,8 @@
         </p:nvSpPr>
         <p:spPr>
           <a:xfrm>
-            <a:off x="4597400" y="329470"/>
-            <a:ext cx="7245604" cy="649224"/>
+            <a:off x="184275" y="329470"/>
+            <a:ext cx="11658729" cy="649224"/>
           </a:xfrm>
         </p:spPr>
         <p:txBody>
@@ -5879,7 +5402,7 @@
         <p:txBody>
           <a:bodyPr anchor="b"/>
           <a:lstStyle>
-            <a:lvl1pPr marL="50800" indent="0" algn="ctr">
+            <a:lvl1pPr marL="50800" indent="0" algn="l">
               <a:buNone/>
               <a:defRPr sz="1800">
                 <a:solidFill>

</xml_diff>

<commit_message>
Fixed title sizing bug, Added KRI 10, 222, 273
</commit_message>
<xml_diff>
--- a/app/data/Remaja_template.pptx
+++ b/app/data/Remaja_template.pptx
@@ -4368,8 +4368,8 @@
         </p:nvSpPr>
         <p:spPr>
           <a:xfrm>
-            <a:off x="838200" y="3012948"/>
-            <a:ext cx="10515600" cy="832104"/>
+            <a:off x="543339" y="3012948"/>
+            <a:ext cx="11092070" cy="832104"/>
           </a:xfrm>
         </p:spPr>
         <p:txBody>
@@ -4547,8 +4547,8 @@
         </p:nvSpPr>
         <p:spPr>
           <a:xfrm>
-            <a:off x="838200" y="3012948"/>
-            <a:ext cx="10515600" cy="832104"/>
+            <a:off x="543339" y="3012948"/>
+            <a:ext cx="11105322" cy="832104"/>
           </a:xfrm>
         </p:spPr>
         <p:txBody>
@@ -4731,8 +4731,8 @@
         </p:nvSpPr>
         <p:spPr>
           <a:xfrm>
-            <a:off x="838200" y="3012948"/>
-            <a:ext cx="10515600" cy="832104"/>
+            <a:off x="556591" y="3012948"/>
+            <a:ext cx="11092070" cy="832104"/>
           </a:xfrm>
         </p:spPr>
         <p:txBody>

</xml_diff>